<commit_message>
uml/sd,ad: Add more info on alternative paths
</commit_message>
<xml_diff>
--- a/diagrams/uml/activityDiagrams/basicNotations/alternatePaths/example.pptx
+++ b/diagrams/uml/activityDiagrams/basicNotations/alternatePaths/example.pptx
@@ -4,6 +4,9 @@
   <p:sldMasterIdLst>
     <p:sldMasterId id="2147483648" r:id="rId1"/>
   </p:sldMasterIdLst>
+  <p:notesMasterIdLst>
+    <p:notesMasterId r:id="rId3"/>
+  </p:notesMasterIdLst>
   <p:sldIdLst>
     <p:sldId id="256" r:id="rId2"/>
   </p:sldIdLst>
@@ -123,6 +126,440 @@
 </p:presentation>
 </file>
 
+<file path=ppt/notesMasters/notesMaster1.xml><?xml version="1.0" encoding="utf-8"?>
+<p:notesMaster xmlns:a="http://schemas.openxmlformats.org/drawingml/2006/main" xmlns:r="http://schemas.openxmlformats.org/officeDocument/2006/relationships" xmlns:p="http://schemas.openxmlformats.org/presentationml/2006/main">
+  <p:cSld>
+    <p:bg>
+      <p:bgRef idx="1001">
+        <a:schemeClr val="bg1"/>
+      </p:bgRef>
+    </p:bg>
+    <p:spTree>
+      <p:nvGrpSpPr>
+        <p:cNvPr id="1" name=""/>
+        <p:cNvGrpSpPr/>
+        <p:nvPr/>
+      </p:nvGrpSpPr>
+      <p:grpSpPr>
+        <a:xfrm>
+          <a:off x="0" y="0"/>
+          <a:ext cx="0" cy="0"/>
+          <a:chOff x="0" y="0"/>
+          <a:chExt cx="0" cy="0"/>
+        </a:xfrm>
+      </p:grpSpPr>
+      <p:sp>
+        <p:nvSpPr>
+          <p:cNvPr id="2" name="Header Placeholder 1"/>
+          <p:cNvSpPr>
+            <a:spLocks noGrp="1"/>
+          </p:cNvSpPr>
+          <p:nvPr>
+            <p:ph type="hdr" sz="quarter"/>
+          </p:nvPr>
+        </p:nvSpPr>
+        <p:spPr>
+          <a:xfrm>
+            <a:off x="0" y="0"/>
+            <a:ext cx="2971800" cy="458788"/>
+          </a:xfrm>
+          <a:prstGeom prst="rect">
+            <a:avLst/>
+          </a:prstGeom>
+        </p:spPr>
+        <p:txBody>
+          <a:bodyPr vert="horz" lIns="91440" tIns="45720" rIns="91440" bIns="45720" rtlCol="0"/>
+          <a:lstStyle>
+            <a:lvl1pPr algn="l">
+              <a:defRPr sz="1200"/>
+            </a:lvl1pPr>
+          </a:lstStyle>
+          <a:p>
+            <a:endParaRPr lang="en-US"/>
+          </a:p>
+        </p:txBody>
+      </p:sp>
+      <p:sp>
+        <p:nvSpPr>
+          <p:cNvPr id="3" name="Date Placeholder 2"/>
+          <p:cNvSpPr>
+            <a:spLocks noGrp="1"/>
+          </p:cNvSpPr>
+          <p:nvPr>
+            <p:ph type="dt" idx="1"/>
+          </p:nvPr>
+        </p:nvSpPr>
+        <p:spPr>
+          <a:xfrm>
+            <a:off x="3884613" y="0"/>
+            <a:ext cx="2971800" cy="458788"/>
+          </a:xfrm>
+          <a:prstGeom prst="rect">
+            <a:avLst/>
+          </a:prstGeom>
+        </p:spPr>
+        <p:txBody>
+          <a:bodyPr vert="horz" lIns="91440" tIns="45720" rIns="91440" bIns="45720" rtlCol="0"/>
+          <a:lstStyle>
+            <a:lvl1pPr algn="r">
+              <a:defRPr sz="1200"/>
+            </a:lvl1pPr>
+          </a:lstStyle>
+          <a:p>
+            <a:fld id="{36088172-9039-4278-9F91-C5AFCB567518}" type="datetimeFigureOut">
+              <a:rPr lang="en-US" smtClean="0"/>
+              <a:t>15-Dec-20</a:t>
+            </a:fld>
+            <a:endParaRPr lang="en-US"/>
+          </a:p>
+        </p:txBody>
+      </p:sp>
+      <p:sp>
+        <p:nvSpPr>
+          <p:cNvPr id="4" name="Slide Image Placeholder 3"/>
+          <p:cNvSpPr>
+            <a:spLocks noGrp="1" noRot="1" noChangeAspect="1"/>
+          </p:cNvSpPr>
+          <p:nvPr>
+            <p:ph type="sldImg" idx="2"/>
+          </p:nvPr>
+        </p:nvSpPr>
+        <p:spPr>
+          <a:xfrm>
+            <a:off x="1371600" y="1143000"/>
+            <a:ext cx="4114800" cy="3086100"/>
+          </a:xfrm>
+          <a:prstGeom prst="rect">
+            <a:avLst/>
+          </a:prstGeom>
+          <a:noFill/>
+          <a:ln w="12700">
+            <a:solidFill>
+              <a:prstClr val="black"/>
+            </a:solidFill>
+          </a:ln>
+        </p:spPr>
+        <p:txBody>
+          <a:bodyPr vert="horz" lIns="91440" tIns="45720" rIns="91440" bIns="45720" rtlCol="0" anchor="ctr"/>
+          <a:lstStyle/>
+          <a:p>
+            <a:endParaRPr lang="en-US"/>
+          </a:p>
+        </p:txBody>
+      </p:sp>
+      <p:sp>
+        <p:nvSpPr>
+          <p:cNvPr id="5" name="Notes Placeholder 4"/>
+          <p:cNvSpPr>
+            <a:spLocks noGrp="1"/>
+          </p:cNvSpPr>
+          <p:nvPr>
+            <p:ph type="body" sz="quarter" idx="3"/>
+          </p:nvPr>
+        </p:nvSpPr>
+        <p:spPr>
+          <a:xfrm>
+            <a:off x="685800" y="4400550"/>
+            <a:ext cx="5486400" cy="3600450"/>
+          </a:xfrm>
+          <a:prstGeom prst="rect">
+            <a:avLst/>
+          </a:prstGeom>
+        </p:spPr>
+        <p:txBody>
+          <a:bodyPr vert="horz" lIns="91440" tIns="45720" rIns="91440" bIns="45720" rtlCol="0"/>
+          <a:lstStyle/>
+          <a:p>
+            <a:pPr lvl="0"/>
+            <a:r>
+              <a:rPr lang="en-US" smtClean="0"/>
+              <a:t>Click to edit Master text styles</a:t>
+            </a:r>
+          </a:p>
+          <a:p>
+            <a:pPr lvl="1"/>
+            <a:r>
+              <a:rPr lang="en-US" smtClean="0"/>
+              <a:t>Second level</a:t>
+            </a:r>
+          </a:p>
+          <a:p>
+            <a:pPr lvl="2"/>
+            <a:r>
+              <a:rPr lang="en-US" smtClean="0"/>
+              <a:t>Third level</a:t>
+            </a:r>
+          </a:p>
+          <a:p>
+            <a:pPr lvl="3"/>
+            <a:r>
+              <a:rPr lang="en-US" smtClean="0"/>
+              <a:t>Fourth level</a:t>
+            </a:r>
+          </a:p>
+          <a:p>
+            <a:pPr lvl="4"/>
+            <a:r>
+              <a:rPr lang="en-US" smtClean="0"/>
+              <a:t>Fifth level</a:t>
+            </a:r>
+            <a:endParaRPr lang="en-US"/>
+          </a:p>
+        </p:txBody>
+      </p:sp>
+      <p:sp>
+        <p:nvSpPr>
+          <p:cNvPr id="6" name="Footer Placeholder 5"/>
+          <p:cNvSpPr>
+            <a:spLocks noGrp="1"/>
+          </p:cNvSpPr>
+          <p:nvPr>
+            <p:ph type="ftr" sz="quarter" idx="4"/>
+          </p:nvPr>
+        </p:nvSpPr>
+        <p:spPr>
+          <a:xfrm>
+            <a:off x="0" y="8685213"/>
+            <a:ext cx="2971800" cy="458787"/>
+          </a:xfrm>
+          <a:prstGeom prst="rect">
+            <a:avLst/>
+          </a:prstGeom>
+        </p:spPr>
+        <p:txBody>
+          <a:bodyPr vert="horz" lIns="91440" tIns="45720" rIns="91440" bIns="45720" rtlCol="0" anchor="b"/>
+          <a:lstStyle>
+            <a:lvl1pPr algn="l">
+              <a:defRPr sz="1200"/>
+            </a:lvl1pPr>
+          </a:lstStyle>
+          <a:p>
+            <a:endParaRPr lang="en-US"/>
+          </a:p>
+        </p:txBody>
+      </p:sp>
+      <p:sp>
+        <p:nvSpPr>
+          <p:cNvPr id="7" name="Slide Number Placeholder 6"/>
+          <p:cNvSpPr>
+            <a:spLocks noGrp="1"/>
+          </p:cNvSpPr>
+          <p:nvPr>
+            <p:ph type="sldNum" sz="quarter" idx="5"/>
+          </p:nvPr>
+        </p:nvSpPr>
+        <p:spPr>
+          <a:xfrm>
+            <a:off x="3884613" y="8685213"/>
+            <a:ext cx="2971800" cy="458787"/>
+          </a:xfrm>
+          <a:prstGeom prst="rect">
+            <a:avLst/>
+          </a:prstGeom>
+        </p:spPr>
+        <p:txBody>
+          <a:bodyPr vert="horz" lIns="91440" tIns="45720" rIns="91440" bIns="45720" rtlCol="0" anchor="b"/>
+          <a:lstStyle>
+            <a:lvl1pPr algn="r">
+              <a:defRPr sz="1200"/>
+            </a:lvl1pPr>
+          </a:lstStyle>
+          <a:p>
+            <a:fld id="{17A0DD8B-3906-49F3-8D0F-4EE5849C4EC8}" type="slidenum">
+              <a:rPr lang="en-US" smtClean="0"/>
+              <a:t>‹#›</a:t>
+            </a:fld>
+            <a:endParaRPr lang="en-US"/>
+          </a:p>
+        </p:txBody>
+      </p:sp>
+    </p:spTree>
+    <p:extLst>
+      <p:ext uri="{BB962C8B-B14F-4D97-AF65-F5344CB8AC3E}">
+        <p14:creationId xmlns:p14="http://schemas.microsoft.com/office/powerpoint/2010/main" val="275419868"/>
+      </p:ext>
+    </p:extLst>
+  </p:cSld>
+  <p:clrMap bg1="lt1" tx1="dk1" bg2="lt2" tx2="dk2" accent1="accent1" accent2="accent2" accent3="accent3" accent4="accent4" accent5="accent5" accent6="accent6" hlink="hlink" folHlink="folHlink"/>
+  <p:notesStyle>
+    <a:lvl1pPr marL="0" algn="l" defTabSz="914400" rtl="0" eaLnBrk="1" latinLnBrk="0" hangingPunct="1">
+      <a:defRPr sz="1200" kern="1200">
+        <a:solidFill>
+          <a:schemeClr val="tx1"/>
+        </a:solidFill>
+        <a:latin typeface="+mn-lt"/>
+        <a:ea typeface="+mn-ea"/>
+        <a:cs typeface="+mn-cs"/>
+      </a:defRPr>
+    </a:lvl1pPr>
+    <a:lvl2pPr marL="457200" algn="l" defTabSz="914400" rtl="0" eaLnBrk="1" latinLnBrk="0" hangingPunct="1">
+      <a:defRPr sz="1200" kern="1200">
+        <a:solidFill>
+          <a:schemeClr val="tx1"/>
+        </a:solidFill>
+        <a:latin typeface="+mn-lt"/>
+        <a:ea typeface="+mn-ea"/>
+        <a:cs typeface="+mn-cs"/>
+      </a:defRPr>
+    </a:lvl2pPr>
+    <a:lvl3pPr marL="914400" algn="l" defTabSz="914400" rtl="0" eaLnBrk="1" latinLnBrk="0" hangingPunct="1">
+      <a:defRPr sz="1200" kern="1200">
+        <a:solidFill>
+          <a:schemeClr val="tx1"/>
+        </a:solidFill>
+        <a:latin typeface="+mn-lt"/>
+        <a:ea typeface="+mn-ea"/>
+        <a:cs typeface="+mn-cs"/>
+      </a:defRPr>
+    </a:lvl3pPr>
+    <a:lvl4pPr marL="1371600" algn="l" defTabSz="914400" rtl="0" eaLnBrk="1" latinLnBrk="0" hangingPunct="1">
+      <a:defRPr sz="1200" kern="1200">
+        <a:solidFill>
+          <a:schemeClr val="tx1"/>
+        </a:solidFill>
+        <a:latin typeface="+mn-lt"/>
+        <a:ea typeface="+mn-ea"/>
+        <a:cs typeface="+mn-cs"/>
+      </a:defRPr>
+    </a:lvl4pPr>
+    <a:lvl5pPr marL="1828800" algn="l" defTabSz="914400" rtl="0" eaLnBrk="1" latinLnBrk="0" hangingPunct="1">
+      <a:defRPr sz="1200" kern="1200">
+        <a:solidFill>
+          <a:schemeClr val="tx1"/>
+        </a:solidFill>
+        <a:latin typeface="+mn-lt"/>
+        <a:ea typeface="+mn-ea"/>
+        <a:cs typeface="+mn-cs"/>
+      </a:defRPr>
+    </a:lvl5pPr>
+    <a:lvl6pPr marL="2286000" algn="l" defTabSz="914400" rtl="0" eaLnBrk="1" latinLnBrk="0" hangingPunct="1">
+      <a:defRPr sz="1200" kern="1200">
+        <a:solidFill>
+          <a:schemeClr val="tx1"/>
+        </a:solidFill>
+        <a:latin typeface="+mn-lt"/>
+        <a:ea typeface="+mn-ea"/>
+        <a:cs typeface="+mn-cs"/>
+      </a:defRPr>
+    </a:lvl6pPr>
+    <a:lvl7pPr marL="2743200" algn="l" defTabSz="914400" rtl="0" eaLnBrk="1" latinLnBrk="0" hangingPunct="1">
+      <a:defRPr sz="1200" kern="1200">
+        <a:solidFill>
+          <a:schemeClr val="tx1"/>
+        </a:solidFill>
+        <a:latin typeface="+mn-lt"/>
+        <a:ea typeface="+mn-ea"/>
+        <a:cs typeface="+mn-cs"/>
+      </a:defRPr>
+    </a:lvl7pPr>
+    <a:lvl8pPr marL="3200400" algn="l" defTabSz="914400" rtl="0" eaLnBrk="1" latinLnBrk="0" hangingPunct="1">
+      <a:defRPr sz="1200" kern="1200">
+        <a:solidFill>
+          <a:schemeClr val="tx1"/>
+        </a:solidFill>
+        <a:latin typeface="+mn-lt"/>
+        <a:ea typeface="+mn-ea"/>
+        <a:cs typeface="+mn-cs"/>
+      </a:defRPr>
+    </a:lvl8pPr>
+    <a:lvl9pPr marL="3657600" algn="l" defTabSz="914400" rtl="0" eaLnBrk="1" latinLnBrk="0" hangingPunct="1">
+      <a:defRPr sz="1200" kern="1200">
+        <a:solidFill>
+          <a:schemeClr val="tx1"/>
+        </a:solidFill>
+        <a:latin typeface="+mn-lt"/>
+        <a:ea typeface="+mn-ea"/>
+        <a:cs typeface="+mn-cs"/>
+      </a:defRPr>
+    </a:lvl9pPr>
+  </p:notesStyle>
+</p:notesMaster>
+</file>
+
+<file path=ppt/notesSlides/notesSlide1.xml><?xml version="1.0" encoding="utf-8"?>
+<p:notes xmlns:a="http://schemas.openxmlformats.org/drawingml/2006/main" xmlns:r="http://schemas.openxmlformats.org/officeDocument/2006/relationships" xmlns:p="http://schemas.openxmlformats.org/presentationml/2006/main">
+  <p:cSld>
+    <p:spTree>
+      <p:nvGrpSpPr>
+        <p:cNvPr id="1" name=""/>
+        <p:cNvGrpSpPr/>
+        <p:nvPr/>
+      </p:nvGrpSpPr>
+      <p:grpSpPr>
+        <a:xfrm>
+          <a:off x="0" y="0"/>
+          <a:ext cx="0" cy="0"/>
+          <a:chOff x="0" y="0"/>
+          <a:chExt cx="0" cy="0"/>
+        </a:xfrm>
+      </p:grpSpPr>
+      <p:sp>
+        <p:nvSpPr>
+          <p:cNvPr id="2" name="Slide Image Placeholder 1"/>
+          <p:cNvSpPr>
+            <a:spLocks noGrp="1" noRot="1" noChangeAspect="1"/>
+          </p:cNvSpPr>
+          <p:nvPr>
+            <p:ph type="sldImg"/>
+          </p:nvPr>
+        </p:nvSpPr>
+        <p:spPr/>
+      </p:sp>
+      <p:sp>
+        <p:nvSpPr>
+          <p:cNvPr id="3" name="Notes Placeholder 2"/>
+          <p:cNvSpPr>
+            <a:spLocks noGrp="1"/>
+          </p:cNvSpPr>
+          <p:nvPr>
+            <p:ph type="body" idx="1"/>
+          </p:nvPr>
+        </p:nvSpPr>
+        <p:spPr/>
+        <p:txBody>
+          <a:bodyPr/>
+          <a:lstStyle/>
+          <a:p>
+            <a:endParaRPr lang="en-US" dirty="0"/>
+          </a:p>
+        </p:txBody>
+      </p:sp>
+      <p:sp>
+        <p:nvSpPr>
+          <p:cNvPr id="4" name="Slide Number Placeholder 3"/>
+          <p:cNvSpPr>
+            <a:spLocks noGrp="1"/>
+          </p:cNvSpPr>
+          <p:nvPr>
+            <p:ph type="sldNum" sz="quarter" idx="10"/>
+          </p:nvPr>
+        </p:nvSpPr>
+        <p:spPr/>
+        <p:txBody>
+          <a:bodyPr/>
+          <a:lstStyle/>
+          <a:p>
+            <a:fld id="{17A0DD8B-3906-49F3-8D0F-4EE5849C4EC8}" type="slidenum">
+              <a:rPr lang="en-US" smtClean="0"/>
+              <a:t>1</a:t>
+            </a:fld>
+            <a:endParaRPr lang="en-US"/>
+          </a:p>
+        </p:txBody>
+      </p:sp>
+    </p:spTree>
+    <p:extLst>
+      <p:ext uri="{BB962C8B-B14F-4D97-AF65-F5344CB8AC3E}">
+        <p14:creationId xmlns:p14="http://schemas.microsoft.com/office/powerpoint/2010/main" val="2383021965"/>
+      </p:ext>
+    </p:extLst>
+  </p:cSld>
+  <p:clrMapOvr>
+    <a:masterClrMapping/>
+  </p:clrMapOvr>
+</p:notes>
+</file>
+
 <file path=ppt/slideLayouts/slideLayout1.xml><?xml version="1.0" encoding="utf-8"?>
 <p:sldLayout xmlns:a="http://schemas.openxmlformats.org/drawingml/2006/main" xmlns:r="http://schemas.openxmlformats.org/officeDocument/2006/relationships" xmlns:p="http://schemas.openxmlformats.org/presentationml/2006/main" type="title" preserve="1">
   <p:cSld name="Title Slide">
@@ -304,7 +741,7 @@
           <a:p>
             <a:fld id="{66D91632-7911-4BFA-A741-BD874230E827}" type="datetimeFigureOut">
               <a:rPr lang="en-SG" smtClean="0"/>
-              <a:t>19/1/2018</a:t>
+              <a:t>15/12/2020</a:t>
             </a:fld>
             <a:endParaRPr lang="en-SG"/>
           </a:p>
@@ -474,7 +911,7 @@
           <a:p>
             <a:fld id="{66D91632-7911-4BFA-A741-BD874230E827}" type="datetimeFigureOut">
               <a:rPr lang="en-SG" smtClean="0"/>
-              <a:t>19/1/2018</a:t>
+              <a:t>15/12/2020</a:t>
             </a:fld>
             <a:endParaRPr lang="en-SG"/>
           </a:p>
@@ -654,7 +1091,7 @@
           <a:p>
             <a:fld id="{66D91632-7911-4BFA-A741-BD874230E827}" type="datetimeFigureOut">
               <a:rPr lang="en-SG" smtClean="0"/>
-              <a:t>19/1/2018</a:t>
+              <a:t>15/12/2020</a:t>
             </a:fld>
             <a:endParaRPr lang="en-SG"/>
           </a:p>
@@ -824,7 +1261,7 @@
           <a:p>
             <a:fld id="{66D91632-7911-4BFA-A741-BD874230E827}" type="datetimeFigureOut">
               <a:rPr lang="en-SG" smtClean="0"/>
-              <a:t>19/1/2018</a:t>
+              <a:t>15/12/2020</a:t>
             </a:fld>
             <a:endParaRPr lang="en-SG"/>
           </a:p>
@@ -1070,7 +1507,7 @@
           <a:p>
             <a:fld id="{66D91632-7911-4BFA-A741-BD874230E827}" type="datetimeFigureOut">
               <a:rPr lang="en-SG" smtClean="0"/>
-              <a:t>19/1/2018</a:t>
+              <a:t>15/12/2020</a:t>
             </a:fld>
             <a:endParaRPr lang="en-SG"/>
           </a:p>
@@ -1358,7 +1795,7 @@
           <a:p>
             <a:fld id="{66D91632-7911-4BFA-A741-BD874230E827}" type="datetimeFigureOut">
               <a:rPr lang="en-SG" smtClean="0"/>
-              <a:t>19/1/2018</a:t>
+              <a:t>15/12/2020</a:t>
             </a:fld>
             <a:endParaRPr lang="en-SG"/>
           </a:p>
@@ -1780,7 +2217,7 @@
           <a:p>
             <a:fld id="{66D91632-7911-4BFA-A741-BD874230E827}" type="datetimeFigureOut">
               <a:rPr lang="en-SG" smtClean="0"/>
-              <a:t>19/1/2018</a:t>
+              <a:t>15/12/2020</a:t>
             </a:fld>
             <a:endParaRPr lang="en-SG"/>
           </a:p>
@@ -1898,7 +2335,7 @@
           <a:p>
             <a:fld id="{66D91632-7911-4BFA-A741-BD874230E827}" type="datetimeFigureOut">
               <a:rPr lang="en-SG" smtClean="0"/>
-              <a:t>19/1/2018</a:t>
+              <a:t>15/12/2020</a:t>
             </a:fld>
             <a:endParaRPr lang="en-SG"/>
           </a:p>
@@ -1993,7 +2430,7 @@
           <a:p>
             <a:fld id="{66D91632-7911-4BFA-A741-BD874230E827}" type="datetimeFigureOut">
               <a:rPr lang="en-SG" smtClean="0"/>
-              <a:t>19/1/2018</a:t>
+              <a:t>15/12/2020</a:t>
             </a:fld>
             <a:endParaRPr lang="en-SG"/>
           </a:p>
@@ -2270,7 +2707,7 @@
           <a:p>
             <a:fld id="{66D91632-7911-4BFA-A741-BD874230E827}" type="datetimeFigureOut">
               <a:rPr lang="en-SG" smtClean="0"/>
-              <a:t>19/1/2018</a:t>
+              <a:t>15/12/2020</a:t>
             </a:fld>
             <a:endParaRPr lang="en-SG"/>
           </a:p>
@@ -2523,7 +2960,7 @@
           <a:p>
             <a:fld id="{66D91632-7911-4BFA-A741-BD874230E827}" type="datetimeFigureOut">
               <a:rPr lang="en-SG" smtClean="0"/>
-              <a:t>19/1/2018</a:t>
+              <a:t>15/12/2020</a:t>
             </a:fld>
             <a:endParaRPr lang="en-SG"/>
           </a:p>
@@ -2736,7 +3173,7 @@
           <a:p>
             <a:fld id="{66D91632-7911-4BFA-A741-BD874230E827}" type="datetimeFigureOut">
               <a:rPr lang="en-SG" smtClean="0"/>
-              <a:t>19/1/2018</a:t>
+              <a:t>15/12/2020</a:t>
             </a:fld>
             <a:endParaRPr lang="en-SG"/>
           </a:p>
@@ -3290,11 +3727,7 @@
           <a:p>
             <a:r>
               <a:rPr lang="en-US" sz="1800" dirty="0" smtClean="0"/>
-              <a:t>Activity: </a:t>
-            </a:r>
-            <a:r>
-              <a:rPr lang="en-US" sz="1800" dirty="0" smtClean="0"/>
-              <a:t>shop for product</a:t>
+              <a:t>Activity: shop for product</a:t>
             </a:r>
             <a:endParaRPr lang="en-US" sz="1800" dirty="0"/>
           </a:p>
@@ -4162,6 +4595,903 @@
           </a:fontRef>
         </p:style>
       </p:cxnSp>
+      <p:sp>
+        <p:nvSpPr>
+          <p:cNvPr id="24" name="Flowchart: Decision 23"/>
+          <p:cNvSpPr/>
+          <p:nvPr/>
+        </p:nvSpPr>
+        <p:spPr>
+          <a:xfrm>
+            <a:off x="3916249" y="5280410"/>
+            <a:ext cx="364319" cy="364319"/>
+          </a:xfrm>
+          <a:prstGeom prst="flowChartDecision">
+            <a:avLst/>
+          </a:prstGeom>
+          <a:solidFill>
+            <a:schemeClr val="bg1"/>
+          </a:solidFill>
+          <a:ln w="28575">
+            <a:solidFill>
+              <a:schemeClr val="tx1"/>
+            </a:solidFill>
+          </a:ln>
+          <a:effectLst/>
+        </p:spPr>
+        <p:style>
+          <a:lnRef idx="1">
+            <a:schemeClr val="accent4"/>
+          </a:lnRef>
+          <a:fillRef idx="2">
+            <a:schemeClr val="accent4"/>
+          </a:fillRef>
+          <a:effectRef idx="1">
+            <a:schemeClr val="accent4"/>
+          </a:effectRef>
+          <a:fontRef idx="minor">
+            <a:schemeClr val="dk1"/>
+          </a:fontRef>
+        </p:style>
+        <p:txBody>
+          <a:bodyPr rtlCol="0" anchor="ctr"/>
+          <a:lstStyle/>
+          <a:p>
+            <a:pPr algn="ctr"/>
+            <a:endParaRPr lang="en-US" dirty="0">
+              <a:solidFill>
+                <a:schemeClr val="tx1"/>
+              </a:solidFill>
+            </a:endParaRPr>
+          </a:p>
+        </p:txBody>
+      </p:sp>
+      <p:sp>
+        <p:nvSpPr>
+          <p:cNvPr id="26" name="Oval 25"/>
+          <p:cNvSpPr/>
+          <p:nvPr/>
+        </p:nvSpPr>
+        <p:spPr>
+          <a:xfrm>
+            <a:off x="2987824" y="5386369"/>
+            <a:ext cx="152400" cy="152400"/>
+          </a:xfrm>
+          <a:prstGeom prst="ellipse">
+            <a:avLst/>
+          </a:prstGeom>
+          <a:solidFill>
+            <a:schemeClr val="tx1"/>
+          </a:solidFill>
+          <a:ln>
+            <a:solidFill>
+              <a:schemeClr val="tx1"/>
+            </a:solidFill>
+          </a:ln>
+          <a:effectLst/>
+        </p:spPr>
+        <p:style>
+          <a:lnRef idx="1">
+            <a:schemeClr val="accent5"/>
+          </a:lnRef>
+          <a:fillRef idx="3">
+            <a:schemeClr val="accent5"/>
+          </a:fillRef>
+          <a:effectRef idx="2">
+            <a:schemeClr val="accent5"/>
+          </a:effectRef>
+          <a:fontRef idx="minor">
+            <a:schemeClr val="lt1"/>
+          </a:fontRef>
+        </p:style>
+        <p:txBody>
+          <a:bodyPr rtlCol="0" anchor="ctr"/>
+          <a:lstStyle/>
+          <a:p>
+            <a:pPr algn="ctr"/>
+            <a:endParaRPr lang="en-US">
+              <a:solidFill>
+                <a:schemeClr val="tx1"/>
+              </a:solidFill>
+            </a:endParaRPr>
+          </a:p>
+        </p:txBody>
+      </p:sp>
+      <p:cxnSp>
+        <p:nvCxnSpPr>
+          <p:cNvPr id="27" name="Elbow Connector 26"/>
+          <p:cNvCxnSpPr>
+            <a:stCxn id="26" idx="6"/>
+          </p:cNvCxnSpPr>
+          <p:nvPr/>
+        </p:nvCxnSpPr>
+        <p:spPr>
+          <a:xfrm>
+            <a:off x="3140224" y="5462569"/>
+            <a:ext cx="762000" cy="1588"/>
+          </a:xfrm>
+          <a:prstGeom prst="bentConnector3">
+            <a:avLst>
+              <a:gd name="adj1" fmla="val 50000"/>
+            </a:avLst>
+          </a:prstGeom>
+          <a:ln>
+            <a:solidFill>
+              <a:schemeClr val="tx1"/>
+            </a:solidFill>
+            <a:tailEnd type="arrow"/>
+          </a:ln>
+        </p:spPr>
+        <p:style>
+          <a:lnRef idx="1">
+            <a:schemeClr val="accent1"/>
+          </a:lnRef>
+          <a:fillRef idx="0">
+            <a:schemeClr val="accent1"/>
+          </a:fillRef>
+          <a:effectRef idx="0">
+            <a:schemeClr val="accent1"/>
+          </a:effectRef>
+          <a:fontRef idx="minor">
+            <a:schemeClr val="tx1"/>
+          </a:fontRef>
+        </p:style>
+      </p:cxnSp>
+      <p:cxnSp>
+        <p:nvCxnSpPr>
+          <p:cNvPr id="29" name="Elbow Connector 28"/>
+          <p:cNvCxnSpPr>
+            <a:stCxn id="24" idx="2"/>
+            <a:endCxn id="60" idx="1"/>
+          </p:cNvCxnSpPr>
+          <p:nvPr/>
+        </p:nvCxnSpPr>
+        <p:spPr>
+          <a:xfrm rot="16200000" flipH="1">
+            <a:off x="4632737" y="5110401"/>
+            <a:ext cx="321556" cy="1390212"/>
+          </a:xfrm>
+          <a:prstGeom prst="bentConnector2">
+            <a:avLst/>
+          </a:prstGeom>
+          <a:ln>
+            <a:solidFill>
+              <a:schemeClr val="tx1"/>
+            </a:solidFill>
+            <a:tailEnd type="arrow"/>
+          </a:ln>
+        </p:spPr>
+        <p:style>
+          <a:lnRef idx="1">
+            <a:schemeClr val="accent1"/>
+          </a:lnRef>
+          <a:fillRef idx="0">
+            <a:schemeClr val="accent1"/>
+          </a:fillRef>
+          <a:effectRef idx="0">
+            <a:schemeClr val="accent1"/>
+          </a:effectRef>
+          <a:fontRef idx="minor">
+            <a:schemeClr val="tx1"/>
+          </a:fontRef>
+        </p:style>
+      </p:cxnSp>
+      <p:sp>
+        <p:nvSpPr>
+          <p:cNvPr id="51" name="TextBox 50"/>
+          <p:cNvSpPr txBox="1"/>
+          <p:nvPr/>
+        </p:nvSpPr>
+        <p:spPr>
+          <a:xfrm>
+            <a:off x="4327008" y="4484815"/>
+            <a:ext cx="600844" cy="369332"/>
+          </a:xfrm>
+          <a:prstGeom prst="rect">
+            <a:avLst/>
+          </a:prstGeom>
+          <a:noFill/>
+        </p:spPr>
+        <p:txBody>
+          <a:bodyPr wrap="square" rtlCol="0">
+            <a:spAutoFit/>
+          </a:bodyPr>
+          <a:lstStyle/>
+          <a:p>
+            <a:pPr algn="r"/>
+            <a:r>
+              <a:rPr lang="en-US" dirty="0" smtClean="0"/>
+              <a:t>[c1]</a:t>
+            </a:r>
+            <a:endParaRPr lang="en-US" dirty="0"/>
+          </a:p>
+        </p:txBody>
+      </p:sp>
+      <p:cxnSp>
+        <p:nvCxnSpPr>
+          <p:cNvPr id="55" name="Elbow Connector 54"/>
+          <p:cNvCxnSpPr>
+            <a:stCxn id="24" idx="0"/>
+            <a:endCxn id="58" idx="1"/>
+          </p:cNvCxnSpPr>
+          <p:nvPr/>
+        </p:nvCxnSpPr>
+        <p:spPr>
+          <a:xfrm rot="5400000" flipH="1" flipV="1">
+            <a:off x="4600502" y="4383253"/>
+            <a:ext cx="395064" cy="1399251"/>
+          </a:xfrm>
+          <a:prstGeom prst="bentConnector2">
+            <a:avLst/>
+          </a:prstGeom>
+          <a:ln>
+            <a:solidFill>
+              <a:schemeClr val="tx1"/>
+            </a:solidFill>
+            <a:tailEnd type="arrow"/>
+          </a:ln>
+        </p:spPr>
+        <p:style>
+          <a:lnRef idx="1">
+            <a:schemeClr val="accent1"/>
+          </a:lnRef>
+          <a:fillRef idx="0">
+            <a:schemeClr val="accent1"/>
+          </a:fillRef>
+          <a:effectRef idx="0">
+            <a:schemeClr val="accent1"/>
+          </a:effectRef>
+          <a:fontRef idx="minor">
+            <a:schemeClr val="tx1"/>
+          </a:fontRef>
+        </p:style>
+      </p:cxnSp>
+      <p:sp>
+        <p:nvSpPr>
+          <p:cNvPr id="58" name="Rounded Rectangle 57"/>
+          <p:cNvSpPr/>
+          <p:nvPr/>
+        </p:nvSpPr>
+        <p:spPr>
+          <a:xfrm>
+            <a:off x="5497660" y="4705326"/>
+            <a:ext cx="739563" cy="360040"/>
+          </a:xfrm>
+          <a:prstGeom prst="roundRect">
+            <a:avLst/>
+          </a:prstGeom>
+          <a:solidFill>
+            <a:schemeClr val="bg1"/>
+          </a:solidFill>
+          <a:ln w="28575">
+            <a:solidFill>
+              <a:schemeClr val="tx1"/>
+            </a:solidFill>
+          </a:ln>
+          <a:effectLst/>
+        </p:spPr>
+        <p:style>
+          <a:lnRef idx="1">
+            <a:schemeClr val="accent4"/>
+          </a:lnRef>
+          <a:fillRef idx="2">
+            <a:schemeClr val="accent4"/>
+          </a:fillRef>
+          <a:effectRef idx="1">
+            <a:schemeClr val="accent4"/>
+          </a:effectRef>
+          <a:fontRef idx="minor">
+            <a:schemeClr val="dk1"/>
+          </a:fontRef>
+        </p:style>
+        <p:txBody>
+          <a:bodyPr rtlCol="0" anchor="ctr"/>
+          <a:lstStyle/>
+          <a:p>
+            <a:pPr algn="ctr"/>
+            <a:r>
+              <a:rPr lang="en-US" dirty="0">
+                <a:solidFill>
+                  <a:schemeClr val="tx1"/>
+                </a:solidFill>
+              </a:rPr>
+              <a:t>a1</a:t>
+            </a:r>
+            <a:endParaRPr lang="en-US" dirty="0">
+              <a:solidFill>
+                <a:schemeClr val="tx1"/>
+              </a:solidFill>
+            </a:endParaRPr>
+          </a:p>
+        </p:txBody>
+      </p:sp>
+      <p:sp>
+        <p:nvSpPr>
+          <p:cNvPr id="60" name="Rounded Rectangle 59"/>
+          <p:cNvSpPr/>
+          <p:nvPr/>
+        </p:nvSpPr>
+        <p:spPr>
+          <a:xfrm>
+            <a:off x="5488621" y="5786265"/>
+            <a:ext cx="739563" cy="360040"/>
+          </a:xfrm>
+          <a:prstGeom prst="roundRect">
+            <a:avLst/>
+          </a:prstGeom>
+          <a:solidFill>
+            <a:schemeClr val="bg1"/>
+          </a:solidFill>
+          <a:ln w="28575">
+            <a:solidFill>
+              <a:schemeClr val="tx1"/>
+            </a:solidFill>
+          </a:ln>
+          <a:effectLst/>
+        </p:spPr>
+        <p:style>
+          <a:lnRef idx="1">
+            <a:schemeClr val="accent4"/>
+          </a:lnRef>
+          <a:fillRef idx="2">
+            <a:schemeClr val="accent4"/>
+          </a:fillRef>
+          <a:effectRef idx="1">
+            <a:schemeClr val="accent4"/>
+          </a:effectRef>
+          <a:fontRef idx="minor">
+            <a:schemeClr val="dk1"/>
+          </a:fontRef>
+        </p:style>
+        <p:txBody>
+          <a:bodyPr rtlCol="0" anchor="ctr"/>
+          <a:lstStyle/>
+          <a:p>
+            <a:pPr algn="ctr"/>
+            <a:r>
+              <a:rPr lang="en-US" dirty="0">
+                <a:solidFill>
+                  <a:schemeClr val="tx1"/>
+                </a:solidFill>
+              </a:rPr>
+              <a:t>a4</a:t>
+            </a:r>
+            <a:endParaRPr lang="en-US" dirty="0">
+              <a:solidFill>
+                <a:schemeClr val="tx1"/>
+              </a:solidFill>
+            </a:endParaRPr>
+          </a:p>
+        </p:txBody>
+      </p:sp>
+      <p:sp>
+        <p:nvSpPr>
+          <p:cNvPr id="61" name="Rounded Rectangle 60"/>
+          <p:cNvSpPr/>
+          <p:nvPr/>
+        </p:nvSpPr>
+        <p:spPr>
+          <a:xfrm>
+            <a:off x="6609707" y="5015849"/>
+            <a:ext cx="739563" cy="360040"/>
+          </a:xfrm>
+          <a:prstGeom prst="roundRect">
+            <a:avLst/>
+          </a:prstGeom>
+          <a:solidFill>
+            <a:schemeClr val="bg1"/>
+          </a:solidFill>
+          <a:ln w="28575">
+            <a:solidFill>
+              <a:schemeClr val="tx1"/>
+            </a:solidFill>
+          </a:ln>
+          <a:effectLst/>
+        </p:spPr>
+        <p:style>
+          <a:lnRef idx="1">
+            <a:schemeClr val="accent4"/>
+          </a:lnRef>
+          <a:fillRef idx="2">
+            <a:schemeClr val="accent4"/>
+          </a:fillRef>
+          <a:effectRef idx="1">
+            <a:schemeClr val="accent4"/>
+          </a:effectRef>
+          <a:fontRef idx="minor">
+            <a:schemeClr val="dk1"/>
+          </a:fontRef>
+        </p:style>
+        <p:txBody>
+          <a:bodyPr rtlCol="0" anchor="ctr"/>
+          <a:lstStyle/>
+          <a:p>
+            <a:pPr algn="ctr"/>
+            <a:r>
+              <a:rPr lang="en-US" dirty="0">
+                <a:solidFill>
+                  <a:schemeClr val="tx1"/>
+                </a:solidFill>
+              </a:rPr>
+              <a:t>a2</a:t>
+            </a:r>
+            <a:endParaRPr lang="en-US" dirty="0">
+              <a:solidFill>
+                <a:schemeClr val="tx1"/>
+              </a:solidFill>
+            </a:endParaRPr>
+          </a:p>
+        </p:txBody>
+      </p:sp>
+      <p:sp>
+        <p:nvSpPr>
+          <p:cNvPr id="62" name="Rounded Rectangle 61"/>
+          <p:cNvSpPr/>
+          <p:nvPr/>
+        </p:nvSpPr>
+        <p:spPr>
+          <a:xfrm>
+            <a:off x="6600562" y="5487736"/>
+            <a:ext cx="739563" cy="360040"/>
+          </a:xfrm>
+          <a:prstGeom prst="roundRect">
+            <a:avLst/>
+          </a:prstGeom>
+          <a:solidFill>
+            <a:schemeClr val="bg1"/>
+          </a:solidFill>
+          <a:ln w="28575">
+            <a:solidFill>
+              <a:schemeClr val="tx1"/>
+            </a:solidFill>
+          </a:ln>
+          <a:effectLst/>
+        </p:spPr>
+        <p:style>
+          <a:lnRef idx="1">
+            <a:schemeClr val="accent4"/>
+          </a:lnRef>
+          <a:fillRef idx="2">
+            <a:schemeClr val="accent4"/>
+          </a:fillRef>
+          <a:effectRef idx="1">
+            <a:schemeClr val="accent4"/>
+          </a:effectRef>
+          <a:fontRef idx="minor">
+            <a:schemeClr val="dk1"/>
+          </a:fontRef>
+        </p:style>
+        <p:txBody>
+          <a:bodyPr rtlCol="0" anchor="ctr"/>
+          <a:lstStyle/>
+          <a:p>
+            <a:pPr algn="ctr"/>
+            <a:r>
+              <a:rPr lang="en-US" dirty="0">
+                <a:solidFill>
+                  <a:schemeClr val="tx1"/>
+                </a:solidFill>
+              </a:rPr>
+              <a:t>a3</a:t>
+            </a:r>
+            <a:endParaRPr lang="en-US" dirty="0">
+              <a:solidFill>
+                <a:schemeClr val="tx1"/>
+              </a:solidFill>
+            </a:endParaRPr>
+          </a:p>
+        </p:txBody>
+      </p:sp>
+      <p:grpSp>
+        <p:nvGrpSpPr>
+          <p:cNvPr id="68" name="Group 19"/>
+          <p:cNvGrpSpPr/>
+          <p:nvPr/>
+        </p:nvGrpSpPr>
+        <p:grpSpPr>
+          <a:xfrm>
+            <a:off x="8181440" y="5301444"/>
+            <a:ext cx="152400" cy="152400"/>
+            <a:chOff x="3048000" y="6096000"/>
+            <a:chExt cx="152400" cy="152400"/>
+          </a:xfrm>
+        </p:grpSpPr>
+        <p:sp>
+          <p:nvSpPr>
+            <p:cNvPr id="69" name="Oval 68"/>
+            <p:cNvSpPr/>
+            <p:nvPr/>
+          </p:nvSpPr>
+          <p:spPr>
+            <a:xfrm>
+              <a:off x="3048000" y="6096000"/>
+              <a:ext cx="152400" cy="152400"/>
+            </a:xfrm>
+            <a:prstGeom prst="ellipse">
+              <a:avLst/>
+            </a:prstGeom>
+            <a:ln w="9525">
+              <a:solidFill>
+                <a:schemeClr val="tx1"/>
+              </a:solidFill>
+            </a:ln>
+          </p:spPr>
+          <p:style>
+            <a:lnRef idx="2">
+              <a:schemeClr val="accent5"/>
+            </a:lnRef>
+            <a:fillRef idx="1">
+              <a:schemeClr val="lt1"/>
+            </a:fillRef>
+            <a:effectRef idx="0">
+              <a:schemeClr val="accent5"/>
+            </a:effectRef>
+            <a:fontRef idx="minor">
+              <a:schemeClr val="dk1"/>
+            </a:fontRef>
+          </p:style>
+          <p:txBody>
+            <a:bodyPr rtlCol="0" anchor="ctr"/>
+            <a:lstStyle/>
+            <a:p>
+              <a:pPr algn="ctr"/>
+              <a:endParaRPr lang="en-US">
+                <a:solidFill>
+                  <a:schemeClr val="tx1"/>
+                </a:solidFill>
+              </a:endParaRPr>
+            </a:p>
+          </p:txBody>
+        </p:sp>
+        <p:sp>
+          <p:nvSpPr>
+            <p:cNvPr id="70" name="Oval 69"/>
+            <p:cNvSpPr/>
+            <p:nvPr/>
+          </p:nvSpPr>
+          <p:spPr>
+            <a:xfrm>
+              <a:off x="3086100" y="6134100"/>
+              <a:ext cx="76200" cy="76200"/>
+            </a:xfrm>
+            <a:prstGeom prst="ellipse">
+              <a:avLst/>
+            </a:prstGeom>
+            <a:solidFill>
+              <a:schemeClr val="tx1"/>
+            </a:solidFill>
+            <a:ln>
+              <a:solidFill>
+                <a:schemeClr val="tx1"/>
+              </a:solidFill>
+            </a:ln>
+          </p:spPr>
+          <p:style>
+            <a:lnRef idx="2">
+              <a:schemeClr val="accent5">
+                <a:shade val="50000"/>
+              </a:schemeClr>
+            </a:lnRef>
+            <a:fillRef idx="1">
+              <a:schemeClr val="accent5"/>
+            </a:fillRef>
+            <a:effectRef idx="0">
+              <a:schemeClr val="accent5"/>
+            </a:effectRef>
+            <a:fontRef idx="minor">
+              <a:schemeClr val="lt1"/>
+            </a:fontRef>
+          </p:style>
+          <p:txBody>
+            <a:bodyPr rtlCol="0" anchor="ctr"/>
+            <a:lstStyle/>
+            <a:p>
+              <a:pPr algn="ctr"/>
+              <a:endParaRPr lang="en-US">
+                <a:solidFill>
+                  <a:schemeClr val="tx1"/>
+                </a:solidFill>
+              </a:endParaRPr>
+            </a:p>
+          </p:txBody>
+        </p:sp>
+      </p:grpSp>
+      <p:cxnSp>
+        <p:nvCxnSpPr>
+          <p:cNvPr id="15" name="Straight Arrow Connector 14"/>
+          <p:cNvCxnSpPr>
+            <a:stCxn id="24" idx="3"/>
+            <a:endCxn id="61" idx="1"/>
+          </p:cNvCxnSpPr>
+          <p:nvPr/>
+        </p:nvCxnSpPr>
+        <p:spPr>
+          <a:xfrm flipV="1">
+            <a:off x="4280568" y="5195869"/>
+            <a:ext cx="2329139" cy="266701"/>
+          </a:xfrm>
+          <a:prstGeom prst="straightConnector1">
+            <a:avLst/>
+          </a:prstGeom>
+          <a:ln>
+            <a:solidFill>
+              <a:schemeClr val="tx1"/>
+            </a:solidFill>
+            <a:tailEnd type="arrow"/>
+          </a:ln>
+        </p:spPr>
+        <p:style>
+          <a:lnRef idx="1">
+            <a:schemeClr val="accent1"/>
+          </a:lnRef>
+          <a:fillRef idx="0">
+            <a:schemeClr val="accent1"/>
+          </a:fillRef>
+          <a:effectRef idx="0">
+            <a:schemeClr val="accent1"/>
+          </a:effectRef>
+          <a:fontRef idx="minor">
+            <a:schemeClr val="tx1"/>
+          </a:fontRef>
+        </p:style>
+      </p:cxnSp>
+      <p:cxnSp>
+        <p:nvCxnSpPr>
+          <p:cNvPr id="71" name="Straight Arrow Connector 70"/>
+          <p:cNvCxnSpPr>
+            <a:stCxn id="24" idx="3"/>
+            <a:endCxn id="62" idx="1"/>
+          </p:cNvCxnSpPr>
+          <p:nvPr/>
+        </p:nvCxnSpPr>
+        <p:spPr>
+          <a:xfrm>
+            <a:off x="4280568" y="5462570"/>
+            <a:ext cx="2319994" cy="205186"/>
+          </a:xfrm>
+          <a:prstGeom prst="straightConnector1">
+            <a:avLst/>
+          </a:prstGeom>
+          <a:ln>
+            <a:solidFill>
+              <a:schemeClr val="tx1"/>
+            </a:solidFill>
+            <a:tailEnd type="arrow"/>
+          </a:ln>
+        </p:spPr>
+        <p:style>
+          <a:lnRef idx="1">
+            <a:schemeClr val="accent1"/>
+          </a:lnRef>
+          <a:fillRef idx="0">
+            <a:schemeClr val="accent1"/>
+          </a:fillRef>
+          <a:effectRef idx="0">
+            <a:schemeClr val="accent1"/>
+          </a:effectRef>
+          <a:fontRef idx="minor">
+            <a:schemeClr val="tx1"/>
+          </a:fontRef>
+        </p:style>
+      </p:cxnSp>
+      <p:cxnSp>
+        <p:nvCxnSpPr>
+          <p:cNvPr id="72" name="Elbow Connector 71"/>
+          <p:cNvCxnSpPr>
+            <a:stCxn id="58" idx="3"/>
+            <a:endCxn id="69" idx="0"/>
+          </p:cNvCxnSpPr>
+          <p:nvPr/>
+        </p:nvCxnSpPr>
+        <p:spPr>
+          <a:xfrm>
+            <a:off x="6237223" y="4885346"/>
+            <a:ext cx="2020417" cy="416098"/>
+          </a:xfrm>
+          <a:prstGeom prst="bentConnector2">
+            <a:avLst/>
+          </a:prstGeom>
+          <a:ln>
+            <a:solidFill>
+              <a:schemeClr val="tx1"/>
+            </a:solidFill>
+            <a:tailEnd type="arrow"/>
+          </a:ln>
+        </p:spPr>
+        <p:style>
+          <a:lnRef idx="1">
+            <a:schemeClr val="accent1"/>
+          </a:lnRef>
+          <a:fillRef idx="0">
+            <a:schemeClr val="accent1"/>
+          </a:fillRef>
+          <a:effectRef idx="0">
+            <a:schemeClr val="accent1"/>
+          </a:effectRef>
+          <a:fontRef idx="minor">
+            <a:schemeClr val="tx1"/>
+          </a:fontRef>
+        </p:style>
+      </p:cxnSp>
+      <p:cxnSp>
+        <p:nvCxnSpPr>
+          <p:cNvPr id="78" name="Elbow Connector 77"/>
+          <p:cNvCxnSpPr>
+            <a:stCxn id="60" idx="3"/>
+            <a:endCxn id="69" idx="4"/>
+          </p:cNvCxnSpPr>
+          <p:nvPr/>
+        </p:nvCxnSpPr>
+        <p:spPr>
+          <a:xfrm flipV="1">
+            <a:off x="6228184" y="5453844"/>
+            <a:ext cx="2029456" cy="512441"/>
+          </a:xfrm>
+          <a:prstGeom prst="bentConnector2">
+            <a:avLst/>
+          </a:prstGeom>
+          <a:ln>
+            <a:solidFill>
+              <a:schemeClr val="tx1"/>
+            </a:solidFill>
+            <a:tailEnd type="arrow"/>
+          </a:ln>
+        </p:spPr>
+        <p:style>
+          <a:lnRef idx="1">
+            <a:schemeClr val="accent1"/>
+          </a:lnRef>
+          <a:fillRef idx="0">
+            <a:schemeClr val="accent1"/>
+          </a:fillRef>
+          <a:effectRef idx="0">
+            <a:schemeClr val="accent1"/>
+          </a:effectRef>
+          <a:fontRef idx="minor">
+            <a:schemeClr val="tx1"/>
+          </a:fontRef>
+        </p:style>
+      </p:cxnSp>
+      <p:cxnSp>
+        <p:nvCxnSpPr>
+          <p:cNvPr id="85" name="Straight Arrow Connector 84"/>
+          <p:cNvCxnSpPr>
+            <a:stCxn id="62" idx="3"/>
+            <a:endCxn id="69" idx="3"/>
+          </p:cNvCxnSpPr>
+          <p:nvPr/>
+        </p:nvCxnSpPr>
+        <p:spPr>
+          <a:xfrm flipV="1">
+            <a:off x="7340125" y="5431526"/>
+            <a:ext cx="863633" cy="236230"/>
+          </a:xfrm>
+          <a:prstGeom prst="straightConnector1">
+            <a:avLst/>
+          </a:prstGeom>
+          <a:ln>
+            <a:solidFill>
+              <a:schemeClr val="tx1"/>
+            </a:solidFill>
+            <a:tailEnd type="arrow"/>
+          </a:ln>
+        </p:spPr>
+        <p:style>
+          <a:lnRef idx="1">
+            <a:schemeClr val="accent1"/>
+          </a:lnRef>
+          <a:fillRef idx="0">
+            <a:schemeClr val="accent1"/>
+          </a:fillRef>
+          <a:effectRef idx="0">
+            <a:schemeClr val="accent1"/>
+          </a:effectRef>
+          <a:fontRef idx="minor">
+            <a:schemeClr val="tx1"/>
+          </a:fontRef>
+        </p:style>
+      </p:cxnSp>
+      <p:cxnSp>
+        <p:nvCxnSpPr>
+          <p:cNvPr id="89" name="Straight Arrow Connector 88"/>
+          <p:cNvCxnSpPr>
+            <a:stCxn id="61" idx="3"/>
+            <a:endCxn id="69" idx="1"/>
+          </p:cNvCxnSpPr>
+          <p:nvPr/>
+        </p:nvCxnSpPr>
+        <p:spPr>
+          <a:xfrm>
+            <a:off x="7349270" y="5195869"/>
+            <a:ext cx="854488" cy="127893"/>
+          </a:xfrm>
+          <a:prstGeom prst="straightConnector1">
+            <a:avLst/>
+          </a:prstGeom>
+          <a:ln>
+            <a:solidFill>
+              <a:schemeClr val="tx1"/>
+            </a:solidFill>
+            <a:tailEnd type="arrow"/>
+          </a:ln>
+        </p:spPr>
+        <p:style>
+          <a:lnRef idx="1">
+            <a:schemeClr val="accent1"/>
+          </a:lnRef>
+          <a:fillRef idx="0">
+            <a:schemeClr val="accent1"/>
+          </a:fillRef>
+          <a:effectRef idx="0">
+            <a:schemeClr val="accent1"/>
+          </a:effectRef>
+          <a:fontRef idx="minor">
+            <a:schemeClr val="tx1"/>
+          </a:fontRef>
+        </p:style>
+      </p:cxnSp>
+      <p:sp>
+        <p:nvSpPr>
+          <p:cNvPr id="94" name="TextBox 93"/>
+          <p:cNvSpPr txBox="1"/>
+          <p:nvPr/>
+        </p:nvSpPr>
+        <p:spPr>
+          <a:xfrm>
+            <a:off x="4327008" y="5006557"/>
+            <a:ext cx="600844" cy="369332"/>
+          </a:xfrm>
+          <a:prstGeom prst="rect">
+            <a:avLst/>
+          </a:prstGeom>
+          <a:noFill/>
+        </p:spPr>
+        <p:txBody>
+          <a:bodyPr wrap="square" rtlCol="0">
+            <a:spAutoFit/>
+          </a:bodyPr>
+          <a:lstStyle/>
+          <a:p>
+            <a:pPr algn="r"/>
+            <a:r>
+              <a:rPr lang="en-US" dirty="0" smtClean="0"/>
+              <a:t>[c2]</a:t>
+            </a:r>
+            <a:endParaRPr lang="en-US" dirty="0"/>
+          </a:p>
+        </p:txBody>
+      </p:sp>
+      <p:sp>
+        <p:nvSpPr>
+          <p:cNvPr id="95" name="TextBox 94"/>
+          <p:cNvSpPr txBox="1"/>
+          <p:nvPr/>
+        </p:nvSpPr>
+        <p:spPr>
+          <a:xfrm>
+            <a:off x="4332275" y="5462568"/>
+            <a:ext cx="600844" cy="369332"/>
+          </a:xfrm>
+          <a:prstGeom prst="rect">
+            <a:avLst/>
+          </a:prstGeom>
+          <a:noFill/>
+        </p:spPr>
+        <p:txBody>
+          <a:bodyPr wrap="square" rtlCol="0">
+            <a:spAutoFit/>
+          </a:bodyPr>
+          <a:lstStyle/>
+          <a:p>
+            <a:pPr algn="r"/>
+            <a:r>
+              <a:rPr lang="en-US" dirty="0" smtClean="0"/>
+              <a:t>[c3]</a:t>
+            </a:r>
+            <a:endParaRPr lang="en-US" dirty="0"/>
+          </a:p>
+        </p:txBody>
+      </p:sp>
     </p:spTree>
     <p:extLst>
       <p:ext uri="{BB962C8B-B14F-4D97-AF65-F5344CB8AC3E}">
@@ -4458,4 +5788,265 @@
   <a:objectDefaults/>
   <a:extraClrSchemeLst/>
 </a:theme>
+</file>
+
+<file path=ppt/theme/theme2.xml><?xml version="1.0" encoding="utf-8"?>
+<a:theme xmlns:a="http://schemas.openxmlformats.org/drawingml/2006/main" name="Office Theme">
+  <a:themeElements>
+    <a:clrScheme name="Office">
+      <a:dk1>
+        <a:sysClr val="windowText" lastClr="000000"/>
+      </a:dk1>
+      <a:lt1>
+        <a:sysClr val="window" lastClr="FFFFFF"/>
+      </a:lt1>
+      <a:dk2>
+        <a:srgbClr val="44546A"/>
+      </a:dk2>
+      <a:lt2>
+        <a:srgbClr val="E7E6E6"/>
+      </a:lt2>
+      <a:accent1>
+        <a:srgbClr val="5B9BD5"/>
+      </a:accent1>
+      <a:accent2>
+        <a:srgbClr val="ED7D31"/>
+      </a:accent2>
+      <a:accent3>
+        <a:srgbClr val="A5A5A5"/>
+      </a:accent3>
+      <a:accent4>
+        <a:srgbClr val="FFC000"/>
+      </a:accent4>
+      <a:accent5>
+        <a:srgbClr val="4472C4"/>
+      </a:accent5>
+      <a:accent6>
+        <a:srgbClr val="70AD47"/>
+      </a:accent6>
+      <a:hlink>
+        <a:srgbClr val="0563C1"/>
+      </a:hlink>
+      <a:folHlink>
+        <a:srgbClr val="954F72"/>
+      </a:folHlink>
+    </a:clrScheme>
+    <a:fontScheme name="Office">
+      <a:majorFont>
+        <a:latin typeface="Calibri Light" panose="020F0302020204030204"/>
+        <a:ea typeface=""/>
+        <a:cs typeface=""/>
+        <a:font script="Jpan" typeface="ＭＳ Ｐゴシック"/>
+        <a:font script="Hang" typeface="맑은 고딕"/>
+        <a:font script="Hans" typeface="宋体"/>
+        <a:font script="Hant" typeface="新細明體"/>
+        <a:font script="Arab" typeface="Times New Roman"/>
+        <a:font script="Hebr" typeface="Times New Roman"/>
+        <a:font script="Thai" typeface="Angsana New"/>
+        <a:font script="Ethi" typeface="Nyala"/>
+        <a:font script="Beng" typeface="Vrinda"/>
+        <a:font script="Gujr" typeface="Shruti"/>
+        <a:font script="Khmr" typeface="MoolBoran"/>
+        <a:font script="Knda" typeface="Tunga"/>
+        <a:font script="Guru" typeface="Raavi"/>
+        <a:font script="Cans" typeface="Euphemia"/>
+        <a:font script="Cher" typeface="Plantagenet Cherokee"/>
+        <a:font script="Yiii" typeface="Microsoft Yi Baiti"/>
+        <a:font script="Tibt" typeface="Microsoft Himalaya"/>
+        <a:font script="Thaa" typeface="MV Boli"/>
+        <a:font script="Deva" typeface="Mangal"/>
+        <a:font script="Telu" typeface="Gautami"/>
+        <a:font script="Taml" typeface="Latha"/>
+        <a:font script="Syrc" typeface="Estrangelo Edessa"/>
+        <a:font script="Orya" typeface="Kalinga"/>
+        <a:font script="Mlym" typeface="Kartika"/>
+        <a:font script="Laoo" typeface="DokChampa"/>
+        <a:font script="Sinh" typeface="Iskoola Pota"/>
+        <a:font script="Mong" typeface="Mongolian Baiti"/>
+        <a:font script="Viet" typeface="Times New Roman"/>
+        <a:font script="Uigh" typeface="Microsoft Uighur"/>
+        <a:font script="Geor" typeface="Sylfaen"/>
+      </a:majorFont>
+      <a:minorFont>
+        <a:latin typeface="Calibri" panose="020F0502020204030204"/>
+        <a:ea typeface=""/>
+        <a:cs typeface=""/>
+        <a:font script="Jpan" typeface="ＭＳ Ｐゴシック"/>
+        <a:font script="Hang" typeface="맑은 고딕"/>
+        <a:font script="Hans" typeface="宋体"/>
+        <a:font script="Hant" typeface="新細明體"/>
+        <a:font script="Arab" typeface="Arial"/>
+        <a:font script="Hebr" typeface="Arial"/>
+        <a:font script="Thai" typeface="Cordia New"/>
+        <a:font script="Ethi" typeface="Nyala"/>
+        <a:font script="Beng" typeface="Vrinda"/>
+        <a:font script="Gujr" typeface="Shruti"/>
+        <a:font script="Khmr" typeface="DaunPenh"/>
+        <a:font script="Knda" typeface="Tunga"/>
+        <a:font script="Guru" typeface="Raavi"/>
+        <a:font script="Cans" typeface="Euphemia"/>
+        <a:font script="Cher" typeface="Plantagenet Cherokee"/>
+        <a:font script="Yiii" typeface="Microsoft Yi Baiti"/>
+        <a:font script="Tibt" typeface="Microsoft Himalaya"/>
+        <a:font script="Thaa" typeface="MV Boli"/>
+        <a:font script="Deva" typeface="Mangal"/>
+        <a:font script="Telu" typeface="Gautami"/>
+        <a:font script="Taml" typeface="Latha"/>
+        <a:font script="Syrc" typeface="Estrangelo Edessa"/>
+        <a:font script="Orya" typeface="Kalinga"/>
+        <a:font script="Mlym" typeface="Kartika"/>
+        <a:font script="Laoo" typeface="DokChampa"/>
+        <a:font script="Sinh" typeface="Iskoola Pota"/>
+        <a:font script="Mong" typeface="Mongolian Baiti"/>
+        <a:font script="Viet" typeface="Arial"/>
+        <a:font script="Uigh" typeface="Microsoft Uighur"/>
+        <a:font script="Geor" typeface="Sylfaen"/>
+      </a:minorFont>
+    </a:fontScheme>
+    <a:fmtScheme name="Office">
+      <a:fillStyleLst>
+        <a:solidFill>
+          <a:schemeClr val="phClr"/>
+        </a:solidFill>
+        <a:gradFill rotWithShape="1">
+          <a:gsLst>
+            <a:gs pos="0">
+              <a:schemeClr val="phClr">
+                <a:lumMod val="110000"/>
+                <a:satMod val="105000"/>
+                <a:tint val="67000"/>
+              </a:schemeClr>
+            </a:gs>
+            <a:gs pos="50000">
+              <a:schemeClr val="phClr">
+                <a:lumMod val="105000"/>
+                <a:satMod val="103000"/>
+                <a:tint val="73000"/>
+              </a:schemeClr>
+            </a:gs>
+            <a:gs pos="100000">
+              <a:schemeClr val="phClr">
+                <a:lumMod val="105000"/>
+                <a:satMod val="109000"/>
+                <a:tint val="81000"/>
+              </a:schemeClr>
+            </a:gs>
+          </a:gsLst>
+          <a:lin ang="5400000" scaled="0"/>
+        </a:gradFill>
+        <a:gradFill rotWithShape="1">
+          <a:gsLst>
+            <a:gs pos="0">
+              <a:schemeClr val="phClr">
+                <a:satMod val="103000"/>
+                <a:lumMod val="102000"/>
+                <a:tint val="94000"/>
+              </a:schemeClr>
+            </a:gs>
+            <a:gs pos="50000">
+              <a:schemeClr val="phClr">
+                <a:satMod val="110000"/>
+                <a:lumMod val="100000"/>
+                <a:shade val="100000"/>
+              </a:schemeClr>
+            </a:gs>
+            <a:gs pos="100000">
+              <a:schemeClr val="phClr">
+                <a:lumMod val="99000"/>
+                <a:satMod val="120000"/>
+                <a:shade val="78000"/>
+              </a:schemeClr>
+            </a:gs>
+          </a:gsLst>
+          <a:lin ang="5400000" scaled="0"/>
+        </a:gradFill>
+      </a:fillStyleLst>
+      <a:lnStyleLst>
+        <a:ln w="6350" cap="flat" cmpd="sng" algn="ctr">
+          <a:solidFill>
+            <a:schemeClr val="phClr"/>
+          </a:solidFill>
+          <a:prstDash val="solid"/>
+          <a:miter lim="800000"/>
+        </a:ln>
+        <a:ln w="12700" cap="flat" cmpd="sng" algn="ctr">
+          <a:solidFill>
+            <a:schemeClr val="phClr"/>
+          </a:solidFill>
+          <a:prstDash val="solid"/>
+          <a:miter lim="800000"/>
+        </a:ln>
+        <a:ln w="19050" cap="flat" cmpd="sng" algn="ctr">
+          <a:solidFill>
+            <a:schemeClr val="phClr"/>
+          </a:solidFill>
+          <a:prstDash val="solid"/>
+          <a:miter lim="800000"/>
+        </a:ln>
+      </a:lnStyleLst>
+      <a:effectStyleLst>
+        <a:effectStyle>
+          <a:effectLst/>
+        </a:effectStyle>
+        <a:effectStyle>
+          <a:effectLst/>
+        </a:effectStyle>
+        <a:effectStyle>
+          <a:effectLst>
+            <a:outerShdw blurRad="57150" dist="19050" dir="5400000" algn="ctr" rotWithShape="0">
+              <a:srgbClr val="000000">
+                <a:alpha val="63000"/>
+              </a:srgbClr>
+            </a:outerShdw>
+          </a:effectLst>
+        </a:effectStyle>
+      </a:effectStyleLst>
+      <a:bgFillStyleLst>
+        <a:solidFill>
+          <a:schemeClr val="phClr"/>
+        </a:solidFill>
+        <a:solidFill>
+          <a:schemeClr val="phClr">
+            <a:tint val="95000"/>
+            <a:satMod val="170000"/>
+          </a:schemeClr>
+        </a:solidFill>
+        <a:gradFill rotWithShape="1">
+          <a:gsLst>
+            <a:gs pos="0">
+              <a:schemeClr val="phClr">
+                <a:tint val="93000"/>
+                <a:satMod val="150000"/>
+                <a:shade val="98000"/>
+                <a:lumMod val="102000"/>
+              </a:schemeClr>
+            </a:gs>
+            <a:gs pos="50000">
+              <a:schemeClr val="phClr">
+                <a:tint val="98000"/>
+                <a:satMod val="130000"/>
+                <a:shade val="90000"/>
+                <a:lumMod val="103000"/>
+              </a:schemeClr>
+            </a:gs>
+            <a:gs pos="100000">
+              <a:schemeClr val="phClr">
+                <a:shade val="63000"/>
+                <a:satMod val="120000"/>
+              </a:schemeClr>
+            </a:gs>
+          </a:gsLst>
+          <a:lin ang="5400000" scaled="0"/>
+        </a:gradFill>
+      </a:bgFillStyleLst>
+    </a:fmtScheme>
+  </a:themeElements>
+  <a:objectDefaults/>
+  <a:extraClrSchemeLst/>
+  <a:extLst>
+    <a:ext uri="{05A4C25C-085E-4340-85A3-A5531E510DB2}">
+      <thm15:themeFamily xmlns:thm15="http://schemas.microsoft.com/office/thememl/2012/main" name="Office Theme" id="{62F939B6-93AF-4DB8-9C6B-D6C7DFDC589F}" vid="{4A3C46E8-61CC-4603-A589-7422A47A8E4A}"/>
+    </a:ext>
+  </a:extLst>
+</a:theme>
 </file>
</xml_diff>